<commit_message>
added link to module 12
</commit_message>
<xml_diff>
--- a/Slides/Lesson 11.2 Using Inheritance to Share Implementations.pptx
+++ b/Slides/Lesson 11.2 Using Inheritance to Share Implementations.pptx
@@ -8057,8 +8057,37 @@
                   <a:schemeClr val="tx1"/>
                 </a:solidFill>
               </a:rPr>
-              <a:t> = (class* object% () </a:t>
-            </a:r>
+              <a:t> = (class* object% </a:t>
+            </a:r>
+            <a:r>
+              <a:rPr lang="en-US" dirty="0" smtClean="0">
+                <a:solidFill>
+                  <a:schemeClr val="tx1"/>
+                </a:solidFill>
+              </a:rPr>
+              <a:t>(</a:t>
+            </a:r>
+            <a:r>
+              <a:rPr lang="en-US" dirty="0" err="1" smtClean="0">
+                <a:solidFill>
+                  <a:schemeClr val="tx1"/>
+                </a:solidFill>
+              </a:rPr>
+              <a:t>SBall</a:t>
+            </a:r>
+            <a:r>
+              <a:rPr lang="en-US" dirty="0" smtClean="0">
+                <a:solidFill>
+                  <a:schemeClr val="tx1"/>
+                </a:solidFill>
+              </a:rPr>
+              <a:t>&lt;%&gt;) </a:t>
+            </a:r>
+            <a:endParaRPr lang="en-US" dirty="0" smtClean="0">
+              <a:solidFill>
+                <a:schemeClr val="tx1"/>
+              </a:solidFill>
+            </a:endParaRPr>
           </a:p>
           <a:p>
             <a:r>
@@ -8189,8 +8218,37 @@
                   <a:schemeClr val="tx1"/>
                 </a:solidFill>
               </a:rPr>
-              <a:t> = (class* Ball% ()</a:t>
-            </a:r>
+              <a:t> = (class* Ball% </a:t>
+            </a:r>
+            <a:r>
+              <a:rPr lang="en-US" dirty="0" smtClean="0">
+                <a:solidFill>
+                  <a:schemeClr val="tx1"/>
+                </a:solidFill>
+              </a:rPr>
+              <a:t>(</a:t>
+            </a:r>
+            <a:r>
+              <a:rPr lang="en-US" dirty="0" err="1" smtClean="0">
+                <a:solidFill>
+                  <a:schemeClr val="tx1"/>
+                </a:solidFill>
+              </a:rPr>
+              <a:t>SBall</a:t>
+            </a:r>
+            <a:r>
+              <a:rPr lang="en-US" dirty="0" smtClean="0">
+                <a:solidFill>
+                  <a:schemeClr val="tx1"/>
+                </a:solidFill>
+              </a:rPr>
+              <a:t>&lt;%&gt;)</a:t>
+            </a:r>
+            <a:endParaRPr lang="en-US" dirty="0" smtClean="0">
+              <a:solidFill>
+                <a:schemeClr val="tx1"/>
+              </a:solidFill>
+            </a:endParaRPr>
           </a:p>
           <a:p>
             <a:r>
@@ -8963,11 +9021,7 @@
             </a:r>
             <a:r>
               <a:rPr lang="en-US" dirty="0" smtClean="0"/>
-              <a:t>and</a:t>
-            </a:r>
-            <a:r>
-              <a:rPr lang="en-US" dirty="0" smtClean="0"/>
-              <a:t> </a:t>
+              <a:t>and </a:t>
             </a:r>
             <a:r>
               <a:rPr lang="en-US" b="1" dirty="0" smtClean="0"/>
@@ -11870,8 +11924,37 @@
                   <a:schemeClr val="tx1"/>
                 </a:solidFill>
               </a:rPr>
-              <a:t>(class* object% ()</a:t>
-            </a:r>
+              <a:t>(class* object% </a:t>
+            </a:r>
+            <a:r>
+              <a:rPr lang="en-US" dirty="0" smtClean="0">
+                <a:solidFill>
+                  <a:schemeClr val="tx1"/>
+                </a:solidFill>
+              </a:rPr>
+              <a:t>(</a:t>
+            </a:r>
+            <a:r>
+              <a:rPr lang="en-US" dirty="0" err="1" smtClean="0">
+                <a:solidFill>
+                  <a:schemeClr val="tx1"/>
+                </a:solidFill>
+              </a:rPr>
+              <a:t>SBall</a:t>
+            </a:r>
+            <a:r>
+              <a:rPr lang="en-US" dirty="0" smtClean="0">
+                <a:solidFill>
+                  <a:schemeClr val="tx1"/>
+                </a:solidFill>
+              </a:rPr>
+              <a:t>&lt;%&gt;)</a:t>
+            </a:r>
+            <a:endParaRPr lang="en-US" dirty="0" smtClean="0">
+              <a:solidFill>
+                <a:schemeClr val="tx1"/>
+              </a:solidFill>
+            </a:endParaRPr>
           </a:p>
           <a:p>
             <a:r>
@@ -12166,8 +12249,37 @@
                   <a:schemeClr val="tx1"/>
                 </a:solidFill>
               </a:rPr>
-              <a:t>(class* object% ()</a:t>
-            </a:r>
+              <a:t>(class* object% </a:t>
+            </a:r>
+            <a:r>
+              <a:rPr lang="en-US" dirty="0" smtClean="0">
+                <a:solidFill>
+                  <a:schemeClr val="tx1"/>
+                </a:solidFill>
+              </a:rPr>
+              <a:t>(</a:t>
+            </a:r>
+            <a:r>
+              <a:rPr lang="en-US" dirty="0" err="1" smtClean="0">
+                <a:solidFill>
+                  <a:schemeClr val="tx1"/>
+                </a:solidFill>
+              </a:rPr>
+              <a:t>SBall</a:t>
+            </a:r>
+            <a:r>
+              <a:rPr lang="en-US" dirty="0" smtClean="0">
+                <a:solidFill>
+                  <a:schemeClr val="tx1"/>
+                </a:solidFill>
+              </a:rPr>
+              <a:t>&lt;%&gt;)</a:t>
+            </a:r>
+            <a:endParaRPr lang="en-US" dirty="0" smtClean="0">
+              <a:solidFill>
+                <a:schemeClr val="tx1"/>
+              </a:solidFill>
+            </a:endParaRPr>
           </a:p>
           <a:p>
             <a:r>
@@ -13152,7 +13264,7 @@
         </p:style>
         <p:txBody>
           <a:bodyPr rtlCol="0" anchor="t" anchorCtr="0">
-            <a:normAutofit/>
+            <a:normAutofit fontScale="92500"/>
           </a:bodyPr>
           <a:lstStyle/>
           <a:p>
@@ -13178,7 +13290,7 @@
                   <a:schemeClr val="tx1"/>
                 </a:solidFill>
               </a:rPr>
-              <a:t>DraggableObj</a:t>
+              <a:t>DraggableWidget</a:t>
             </a:r>
             <a:r>
               <a:rPr lang="en-US" dirty="0" smtClean="0">
@@ -13188,6 +13300,63 @@
               </a:rPr>
               <a:t>%</a:t>
             </a:r>
+          </a:p>
+          <a:p>
+            <a:r>
+              <a:rPr lang="en-US" dirty="0" smtClean="0">
+                <a:solidFill>
+                  <a:schemeClr val="tx1"/>
+                </a:solidFill>
+              </a:rPr>
+              <a:t>(</a:t>
+            </a:r>
+            <a:r>
+              <a:rPr lang="en-US" dirty="0" err="1" smtClean="0">
+                <a:solidFill>
+                  <a:schemeClr val="tx1"/>
+                </a:solidFill>
+              </a:rPr>
+              <a:t>SBall</a:t>
+            </a:r>
+            <a:r>
+              <a:rPr lang="en-US" dirty="0" smtClean="0">
+                <a:solidFill>
+                  <a:schemeClr val="tx1"/>
+                </a:solidFill>
+              </a:rPr>
+              <a:t>&lt;%&gt; </a:t>
+            </a:r>
+          </a:p>
+          <a:p>
+            <a:r>
+              <a:rPr lang="en-US" dirty="0" smtClean="0">
+                <a:solidFill>
+                  <a:schemeClr val="tx1"/>
+                </a:solidFill>
+              </a:rPr>
+              <a:t> </a:t>
+            </a:r>
+            <a:r>
+              <a:rPr lang="en-US" dirty="0" err="1" smtClean="0">
+                <a:solidFill>
+                  <a:schemeClr val="tx1"/>
+                </a:solidFill>
+              </a:rPr>
+              <a:t>DraggableWidgetHooks</a:t>
+            </a:r>
+            <a:r>
+              <a:rPr lang="en-US" dirty="0" smtClean="0">
+                <a:solidFill>
+                  <a:schemeClr val="tx1"/>
+                </a:solidFill>
+              </a:rPr>
+              <a:t>&lt;%&gt;)</a:t>
+            </a:r>
+            <a:endParaRPr lang="en-US" dirty="0" smtClean="0">
+              <a:solidFill>
+                <a:schemeClr val="tx1"/>
+              </a:solidFill>
+            </a:endParaRPr>
           </a:p>
           <a:p>
             <a:r>
@@ -13364,7 +13533,7 @@
         <p:spPr>
           <a:xfrm>
             <a:off x="4985657" y="2264230"/>
-            <a:ext cx="3558268" cy="3746046"/>
+            <a:ext cx="3847950" cy="3746046"/>
           </a:xfrm>
           <a:prstGeom prst="rect">
             <a:avLst/>
@@ -13399,7 +13568,7 @@
           <a:lstStyle/>
           <a:p>
             <a:r>
-              <a:rPr lang="en-US" b="1" dirty="0" smtClean="0">
+              <a:rPr lang="en-US" sz="1700" b="1" dirty="0" smtClean="0">
                 <a:solidFill>
                   <a:schemeClr val="tx1"/>
                 </a:solidFill>
@@ -13407,7 +13576,7 @@
               <a:t>Square</a:t>
             </a:r>
             <a:r>
-              <a:rPr lang="en-US" dirty="0" smtClean="0">
+              <a:rPr lang="en-US" sz="1700" dirty="0" smtClean="0">
                 <a:solidFill>
                   <a:schemeClr val="tx1"/>
                 </a:solidFill>
@@ -13415,35 +13584,95 @@
               <a:t>%  = (class* </a:t>
             </a:r>
             <a:r>
-              <a:rPr lang="en-US" dirty="0" err="1" smtClean="0">
+              <a:rPr lang="en-US" sz="1700" dirty="0" err="1" smtClean="0">
                 <a:solidFill>
                   <a:schemeClr val="tx1"/>
                 </a:solidFill>
               </a:rPr>
-              <a:t>DraggableObj</a:t>
-            </a:r>
-            <a:r>
-              <a:rPr lang="en-US" dirty="0" smtClean="0">
+              <a:t>DraggableWidget</a:t>
+            </a:r>
+            <a:r>
+              <a:rPr lang="en-US" sz="1700" dirty="0" smtClean="0">
                 <a:solidFill>
                   <a:schemeClr val="tx1"/>
                 </a:solidFill>
               </a:rPr>
-              <a:t>% </a:t>
-            </a:r>
-          </a:p>
-          <a:p>
-            <a:r>
-              <a:rPr lang="en-US" dirty="0" smtClean="0">
+              <a:t>%</a:t>
+            </a:r>
+          </a:p>
+          <a:p>
+            <a:r>
+              <a:rPr lang="en-US" sz="1700" dirty="0">
                 <a:solidFill>
                   <a:schemeClr val="tx1"/>
                 </a:solidFill>
               </a:rPr>
-              <a:t>(inherit-field x y)</a:t>
-            </a:r>
-          </a:p>
-          <a:p>
-            <a:r>
-              <a:rPr lang="en-US" dirty="0" smtClean="0">
+              <a:t>(</a:t>
+            </a:r>
+            <a:r>
+              <a:rPr lang="en-US" sz="1700" dirty="0" err="1">
+                <a:solidFill>
+                  <a:schemeClr val="tx1"/>
+                </a:solidFill>
+              </a:rPr>
+              <a:t>SBall</a:t>
+            </a:r>
+            <a:r>
+              <a:rPr lang="en-US" sz="1700" dirty="0">
+                <a:solidFill>
+                  <a:schemeClr val="tx1"/>
+                </a:solidFill>
+              </a:rPr>
+              <a:t>&lt;%&gt; </a:t>
+            </a:r>
+          </a:p>
+          <a:p>
+            <a:r>
+              <a:rPr lang="en-US" sz="1700" dirty="0">
+                <a:solidFill>
+                  <a:schemeClr val="tx1"/>
+                </a:solidFill>
+              </a:rPr>
+              <a:t> </a:t>
+            </a:r>
+            <a:r>
+              <a:rPr lang="en-US" sz="1700" dirty="0" err="1">
+                <a:solidFill>
+                  <a:schemeClr val="tx1"/>
+                </a:solidFill>
+              </a:rPr>
+              <a:t>DraggableWidgetHooks</a:t>
+            </a:r>
+            <a:r>
+              <a:rPr lang="en-US" sz="1700" dirty="0">
+                <a:solidFill>
+                  <a:schemeClr val="tx1"/>
+                </a:solidFill>
+              </a:rPr>
+              <a:t>&lt;%&gt;)</a:t>
+            </a:r>
+          </a:p>
+          <a:p>
+            <a:r>
+              <a:rPr lang="en-US" sz="1700" dirty="0" smtClean="0">
+                <a:solidFill>
+                  <a:schemeClr val="tx1"/>
+                </a:solidFill>
+              </a:rPr>
+              <a:t>(</a:t>
+            </a:r>
+            <a:r>
+              <a:rPr lang="en-US" sz="1700" dirty="0" smtClean="0">
+                <a:solidFill>
+                  <a:schemeClr val="tx1"/>
+                </a:solidFill>
+              </a:rPr>
+              <a:t>inherit-field x y)</a:t>
+            </a:r>
+          </a:p>
+          <a:p>
+            <a:r>
+              <a:rPr lang="en-US" sz="1700" dirty="0" smtClean="0">
                 <a:solidFill>
                   <a:srgbClr val="FF0000"/>
                 </a:solidFill>
@@ -13452,7 +13681,7 @@
             </a:r>
           </a:p>
           <a:p>
-            <a:endParaRPr lang="en-US" dirty="0" smtClean="0">
+            <a:endParaRPr lang="en-US" sz="1700" dirty="0" smtClean="0">
               <a:solidFill>
                 <a:srgbClr val="FF0000"/>
               </a:solidFill>
@@ -13460,7 +13689,7 @@
           </a:p>
           <a:p>
             <a:r>
-              <a:rPr lang="en-US" dirty="0" smtClean="0">
+              <a:rPr lang="en-US" sz="1700" dirty="0" smtClean="0">
                 <a:solidFill>
                   <a:srgbClr val="FF0000"/>
                 </a:solidFill>
@@ -13470,7 +13699,7 @@
           </a:p>
           <a:p>
             <a:r>
-              <a:rPr lang="en-US" dirty="0" smtClean="0">
+              <a:rPr lang="en-US" sz="1700" dirty="0" smtClean="0">
                 <a:solidFill>
                   <a:srgbClr val="FF0000"/>
                 </a:solidFill>
@@ -13479,7 +13708,7 @@
             </a:r>
           </a:p>
           <a:p>
-            <a:endParaRPr lang="en-US" dirty="0" smtClean="0">
+            <a:endParaRPr lang="en-US" sz="1700" dirty="0" smtClean="0">
               <a:solidFill>
                 <a:schemeClr val="tx1"/>
               </a:solidFill>
@@ -13487,7 +13716,7 @@
           </a:p>
           <a:p>
             <a:r>
-              <a:rPr lang="en-US" dirty="0" smtClean="0">
+              <a:rPr lang="en-US" sz="1700" dirty="0" smtClean="0">
                 <a:solidFill>
                   <a:srgbClr val="FF0000"/>
                 </a:solidFill>
@@ -13495,7 +13724,7 @@
               <a:t>(define</a:t>
             </a:r>
             <a:r>
-              <a:rPr lang="en-US" dirty="0" smtClean="0">
+              <a:rPr lang="en-US" sz="1700" dirty="0" smtClean="0">
                 <a:solidFill>
                   <a:schemeClr val="accent3"/>
                 </a:solidFill>
@@ -13505,7 +13734,7 @@
           </a:p>
           <a:p>
             <a:r>
-              <a:rPr lang="en-US" dirty="0" smtClean="0">
+              <a:rPr lang="en-US" sz="1700" dirty="0" smtClean="0">
                 <a:solidFill>
                   <a:srgbClr val="FF0000"/>
                 </a:solidFill>
@@ -13513,7 +13742,7 @@
               <a:t>  (in-this? </a:t>
             </a:r>
             <a:r>
-              <a:rPr lang="en-US" dirty="0" err="1" smtClean="0">
+              <a:rPr lang="en-US" sz="1700" dirty="0" err="1" smtClean="0">
                 <a:solidFill>
                   <a:srgbClr val="FF0000"/>
                 </a:solidFill>
@@ -13521,7 +13750,7 @@
               <a:t>mx</a:t>
             </a:r>
             <a:r>
-              <a:rPr lang="en-US" dirty="0" smtClean="0">
+              <a:rPr lang="en-US" sz="1700" dirty="0" smtClean="0">
                 <a:solidFill>
                   <a:srgbClr val="FF0000"/>
                 </a:solidFill>
@@ -13530,7 +13759,7 @@
             </a:r>
           </a:p>
           <a:p>
-            <a:endParaRPr lang="en-US" dirty="0" smtClean="0">
+            <a:endParaRPr lang="en-US" sz="1700" dirty="0" smtClean="0">
               <a:solidFill>
                 <a:schemeClr val="tx1"/>
               </a:solidFill>
@@ -13538,7 +13767,7 @@
           </a:p>
           <a:p>
             <a:r>
-              <a:rPr lang="en-US" dirty="0" smtClean="0">
+              <a:rPr lang="en-US" sz="1700" dirty="0" smtClean="0">
                 <a:solidFill>
                   <a:srgbClr val="FF0000"/>
                 </a:solidFill>
@@ -13546,7 +13775,7 @@
               <a:t>(define</a:t>
             </a:r>
             <a:r>
-              <a:rPr lang="en-US" dirty="0" smtClean="0">
+              <a:rPr lang="en-US" sz="1700" dirty="0" smtClean="0">
                 <a:solidFill>
                   <a:schemeClr val="accent3"/>
                 </a:solidFill>
@@ -13556,7 +13785,7 @@
           </a:p>
           <a:p>
             <a:r>
-              <a:rPr lang="en-US" dirty="0" smtClean="0">
+              <a:rPr lang="en-US" sz="1700" dirty="0" smtClean="0">
                 <a:solidFill>
                   <a:srgbClr val="FF0000"/>
                 </a:solidFill>
@@ -13564,7 +13793,7 @@
               <a:t>  (next-x-</a:t>
             </a:r>
             <a:r>
-              <a:rPr lang="en-US" dirty="0" err="1" smtClean="0">
+              <a:rPr lang="en-US" sz="1700" dirty="0" err="1" smtClean="0">
                 <a:solidFill>
                   <a:srgbClr val="FF0000"/>
                 </a:solidFill>
@@ -13572,7 +13801,7 @@
               <a:t>pos</a:t>
             </a:r>
             <a:r>
-              <a:rPr lang="en-US" dirty="0" smtClean="0">
+              <a:rPr lang="en-US" sz="1700" dirty="0" smtClean="0">
                 <a:solidFill>
                   <a:srgbClr val="FF0000"/>
                 </a:solidFill>
@@ -13580,21 +13809,21 @@
               <a:t>) ...)    </a:t>
             </a:r>
             <a:r>
-              <a:rPr lang="en-US" dirty="0" smtClean="0">
+              <a:rPr lang="en-US" sz="1700" dirty="0" smtClean="0">
                 <a:solidFill>
                   <a:schemeClr val="tx1"/>
                 </a:solidFill>
               </a:rPr>
               <a:t>)</a:t>
             </a:r>
-            <a:endParaRPr lang="en-US" dirty="0" smtClean="0">
+            <a:endParaRPr lang="en-US" sz="1700" dirty="0" smtClean="0">
               <a:solidFill>
                 <a:srgbClr val="FF0000"/>
               </a:solidFill>
             </a:endParaRPr>
           </a:p>
           <a:p>
-            <a:endParaRPr lang="en-US" dirty="0" smtClean="0">
+            <a:endParaRPr lang="en-US" sz="1700" dirty="0" smtClean="0">
               <a:solidFill>
                 <a:schemeClr val="tx1"/>
               </a:solidFill>
@@ -13675,7 +13904,7 @@
         </p:style>
         <p:txBody>
           <a:bodyPr numCol="2" rtlCol="0" anchor="t" anchorCtr="0">
-            <a:normAutofit/>
+            <a:normAutofit lnSpcReduction="10000"/>
           </a:bodyPr>
           <a:lstStyle/>
           <a:p>
@@ -13685,7 +13914,7 @@
                   <a:schemeClr val="tx1"/>
                 </a:solidFill>
               </a:rPr>
-              <a:t>DraggableObj</a:t>
+              <a:t>DraggableWidget</a:t>
             </a:r>
             <a:r>
               <a:rPr lang="en-US" b="1" dirty="0" smtClean="0">
@@ -13701,20 +13930,66 @@
                   <a:schemeClr val="tx1"/>
                 </a:solidFill>
               </a:rPr>
-              <a:t>  = (class* object%</a:t>
-            </a:r>
-          </a:p>
-          <a:p>
+              <a:t>  </a:t>
+            </a:r>
             <a:r>
               <a:rPr lang="en-US" dirty="0" smtClean="0">
                 <a:solidFill>
                   <a:schemeClr val="tx1"/>
                 </a:solidFill>
               </a:rPr>
-              <a:t>(field x y)</a:t>
-            </a:r>
-          </a:p>
-          <a:p>
+              <a:t>= (class* object</a:t>
+            </a:r>
+            <a:r>
+              <a:rPr lang="en-US" dirty="0" smtClean="0">
+                <a:solidFill>
+                  <a:schemeClr val="tx1"/>
+                </a:solidFill>
+              </a:rPr>
+              <a:t>%</a:t>
+            </a:r>
+          </a:p>
+          <a:p>
+            <a:r>
+              <a:rPr lang="en-US" dirty="0">
+                <a:solidFill>
+                  <a:schemeClr val="tx1"/>
+                </a:solidFill>
+              </a:rPr>
+              <a:t> </a:t>
+            </a:r>
+            <a:r>
+              <a:rPr lang="en-US" dirty="0" smtClean="0">
+                <a:solidFill>
+                  <a:schemeClr val="tx1"/>
+                </a:solidFill>
+              </a:rPr>
+              <a:t>  </a:t>
+            </a:r>
+            <a:r>
+              <a:rPr lang="en-US" dirty="0" smtClean="0">
+                <a:solidFill>
+                  <a:schemeClr val="tx1"/>
+                </a:solidFill>
+              </a:rPr>
+              <a:t>(</a:t>
+            </a:r>
+            <a:r>
+              <a:rPr lang="en-US" dirty="0" err="1" smtClean="0">
+                <a:solidFill>
+                  <a:schemeClr val="tx1"/>
+                </a:solidFill>
+              </a:rPr>
+              <a:t>SBall</a:t>
+            </a:r>
+            <a:r>
+              <a:rPr lang="en-US" dirty="0" smtClean="0">
+                <a:solidFill>
+                  <a:schemeClr val="tx1"/>
+                </a:solidFill>
+              </a:rPr>
+              <a:t>&lt;%&gt;)</a:t>
+            </a:r>
             <a:endParaRPr lang="en-US" dirty="0" smtClean="0">
               <a:solidFill>
                 <a:schemeClr val="tx1"/>
@@ -13728,17 +14003,66 @@
                   <a:schemeClr val="tx1"/>
                 </a:solidFill>
               </a:rPr>
-              <a:t>(define/public </a:t>
-            </a:r>
-          </a:p>
-          <a:p>
+              <a:t>   (</a:t>
+            </a:r>
             <a:r>
               <a:rPr lang="en-US" dirty="0" smtClean="0">
                 <a:solidFill>
                   <a:schemeClr val="tx1"/>
                 </a:solidFill>
               </a:rPr>
-              <a:t>  (after-button-down mx my </a:t>
+              <a:t>field x y)</a:t>
+            </a:r>
+          </a:p>
+          <a:p>
+            <a:endParaRPr lang="en-US" dirty="0" smtClean="0">
+              <a:solidFill>
+                <a:schemeClr val="tx1"/>
+              </a:solidFill>
+            </a:endParaRPr>
+          </a:p>
+          <a:p>
+            <a:r>
+              <a:rPr lang="en-US" dirty="0" smtClean="0">
+                <a:solidFill>
+                  <a:schemeClr val="tx1"/>
+                </a:solidFill>
+              </a:rPr>
+              <a:t>   (</a:t>
+            </a:r>
+            <a:r>
+              <a:rPr lang="en-US" dirty="0" smtClean="0">
+                <a:solidFill>
+                  <a:schemeClr val="tx1"/>
+                </a:solidFill>
+              </a:rPr>
+              <a:t>define/public </a:t>
+            </a:r>
+          </a:p>
+          <a:p>
+            <a:r>
+              <a:rPr lang="en-US" dirty="0" smtClean="0">
+                <a:solidFill>
+                  <a:schemeClr val="tx1"/>
+                </a:solidFill>
+              </a:rPr>
+              <a:t>  </a:t>
+            </a:r>
+            <a:r>
+              <a:rPr lang="en-US" dirty="0" smtClean="0">
+                <a:solidFill>
+                  <a:schemeClr val="tx1"/>
+                </a:solidFill>
+              </a:rPr>
+              <a:t>  (</a:t>
+            </a:r>
+            <a:r>
+              <a:rPr lang="en-US" dirty="0" smtClean="0">
+                <a:solidFill>
+                  <a:schemeClr val="tx1"/>
+                </a:solidFill>
+              </a:rPr>
+              <a:t>after-button-down mx my </a:t>
             </a:r>
             <a:r>
               <a:rPr lang="en-US" dirty="0" err="1" smtClean="0">
@@ -13758,6 +14082,14 @@
             </a:r>
           </a:p>
           <a:p>
+            <a:r>
+              <a:rPr lang="en-US" dirty="0" smtClean="0">
+                <a:solidFill>
+                  <a:schemeClr val="tx1"/>
+                </a:solidFill>
+              </a:rPr>
+              <a:t>  </a:t>
+            </a:r>
             <a:r>
               <a:rPr lang="en-US" dirty="0" smtClean="0">
                 <a:solidFill>

</xml_diff>

<commit_message>
Module 11 RC 1
</commit_message>
<xml_diff>
--- a/Slides/Lesson 11.2 Using Inheritance to Share Implementations.pptx
+++ b/Slides/Lesson 11.2 Using Inheritance to Share Implementations.pptx
@@ -5,7 +5,7 @@
     <p:sldMasterId id="2147483661" r:id="rId1"/>
   </p:sldMasterIdLst>
   <p:notesMasterIdLst>
-    <p:notesMasterId r:id="rId40"/>
+    <p:notesMasterId r:id="rId41"/>
   </p:notesMasterIdLst>
   <p:sldIdLst>
     <p:sldId id="256" r:id="rId2"/>
@@ -45,12 +45,13 @@
     <p:sldId id="311" r:id="rId36"/>
     <p:sldId id="361" r:id="rId37"/>
     <p:sldId id="365" r:id="rId38"/>
-    <p:sldId id="362" r:id="rId39"/>
+    <p:sldId id="386" r:id="rId39"/>
+    <p:sldId id="362" r:id="rId40"/>
   </p:sldIdLst>
   <p:sldSz cx="9144000" cy="6858000" type="screen4x3"/>
   <p:notesSz cx="6858000" cy="9144000"/>
   <p:custDataLst>
-    <p:tags r:id="rId41"/>
+    <p:tags r:id="rId42"/>
   </p:custDataLst>
   <p:defaultTextStyle>
     <a:defPPr>
@@ -189,6 +190,7 @@
             <p14:sldId id="311"/>
             <p14:sldId id="361"/>
             <p14:sldId id="365"/>
+            <p14:sldId id="386"/>
             <p14:sldId id="362"/>
           </p14:sldIdLst>
         </p14:section>
@@ -20348,7 +20350,7 @@
         <p:spPr/>
         <p:txBody>
           <a:bodyPr>
-            <a:normAutofit fontScale="92500" lnSpcReduction="20000"/>
+            <a:normAutofit fontScale="85000" lnSpcReduction="20000"/>
           </a:bodyPr>
           <a:lstStyle/>
           <a:p>
@@ -20417,7 +20419,7 @@
             <a:pPr lvl="2"/>
             <a:r>
               <a:rPr lang="en-US" dirty="0"/>
-              <a:t>Here I’ve separated the system into several files, with one file per class.</a:t>
+              <a:t>Here I’ve separated the system into several files, with one file per class.  We go from a single 800+ -line file to files of 150 lines or less, each of which is much easier to understand!</a:t>
             </a:r>
           </a:p>
         </p:txBody>
@@ -20488,6 +20490,454 @@
         </p:nvSpPr>
         <p:spPr/>
         <p:txBody>
+          <a:bodyPr>
+            <a:normAutofit fontScale="90000"/>
+          </a:bodyPr>
+          <a:lstStyle/>
+          <a:p>
+            <a:r>
+              <a:rPr lang="en-US" dirty="0"/>
+              <a:t>Dependency Graph for 11-7-separate-files</a:t>
+            </a:r>
+          </a:p>
+        </p:txBody>
+      </p:sp>
+      <p:sp>
+        <p:nvSpPr>
+          <p:cNvPr id="4" name="Slide Number Placeholder 3"/>
+          <p:cNvSpPr>
+            <a:spLocks noGrp="1"/>
+          </p:cNvSpPr>
+          <p:nvPr>
+            <p:ph type="sldNum" sz="quarter" idx="12"/>
+          </p:nvPr>
+        </p:nvSpPr>
+        <p:spPr/>
+        <p:txBody>
+          <a:bodyPr/>
+          <a:lstStyle/>
+          <a:p>
+            <a:fld id="{2AF3B5EA-18B6-4040-9F78-6052AF49C681}" type="slidenum">
+              <a:rPr lang="en-US" smtClean="0"/>
+              <a:t>38</a:t>
+            </a:fld>
+            <a:endParaRPr lang="en-US"/>
+          </a:p>
+        </p:txBody>
+      </p:sp>
+      <p:sp>
+        <p:nvSpPr>
+          <p:cNvPr id="7" name="Rectangle 6"/>
+          <p:cNvSpPr/>
+          <p:nvPr/>
+        </p:nvSpPr>
+        <p:spPr>
+          <a:xfrm>
+            <a:off x="1837592" y="2234283"/>
+            <a:ext cx="1345223" cy="756139"/>
+          </a:xfrm>
+          <a:prstGeom prst="rect">
+            <a:avLst/>
+          </a:prstGeom>
+          <a:noFill/>
+          <a:ln w="12700">
+            <a:solidFill>
+              <a:schemeClr val="tx1"/>
+            </a:solidFill>
+          </a:ln>
+        </p:spPr>
+        <p:style>
+          <a:lnRef idx="2">
+            <a:schemeClr val="accent1"/>
+          </a:lnRef>
+          <a:fillRef idx="1">
+            <a:schemeClr val="lt1"/>
+          </a:fillRef>
+          <a:effectRef idx="0">
+            <a:schemeClr val="accent1"/>
+          </a:effectRef>
+          <a:fontRef idx="minor">
+            <a:schemeClr val="dk1"/>
+          </a:fontRef>
+        </p:style>
+        <p:txBody>
+          <a:bodyPr rot="0" spcFirstLastPara="0" vertOverflow="overflow" horzOverflow="overflow" vert="horz" wrap="square" lIns="91440" tIns="45720" rIns="91440" bIns="45720" numCol="1" spcCol="0" rtlCol="0" fromWordArt="0" anchor="ctr" anchorCtr="0" forceAA="0" compatLnSpc="1">
+            <a:prstTxWarp prst="textNoShape">
+              <a:avLst/>
+            </a:prstTxWarp>
+            <a:noAutofit/>
+          </a:bodyPr>
+          <a:lstStyle/>
+          <a:p>
+            <a:pPr algn="ctr"/>
+            <a:r>
+              <a:rPr lang="en-US" sz="2400" dirty="0" err="1">
+                <a:solidFill>
+                  <a:schemeClr val="tx1"/>
+                </a:solidFill>
+              </a:rPr>
+              <a:t>SBall.rkt</a:t>
+            </a:r>
+            <a:endParaRPr lang="en-US" sz="2400" dirty="0">
+              <a:solidFill>
+                <a:schemeClr val="tx1"/>
+              </a:solidFill>
+            </a:endParaRPr>
+          </a:p>
+        </p:txBody>
+      </p:sp>
+      <p:sp>
+        <p:nvSpPr>
+          <p:cNvPr id="8" name="Rectangle 7"/>
+          <p:cNvSpPr/>
+          <p:nvPr/>
+        </p:nvSpPr>
+        <p:spPr>
+          <a:xfrm>
+            <a:off x="1608992" y="4563207"/>
+            <a:ext cx="2708031" cy="756139"/>
+          </a:xfrm>
+          <a:prstGeom prst="rect">
+            <a:avLst/>
+          </a:prstGeom>
+          <a:noFill/>
+          <a:ln w="12700">
+            <a:solidFill>
+              <a:schemeClr val="tx1"/>
+            </a:solidFill>
+          </a:ln>
+        </p:spPr>
+        <p:style>
+          <a:lnRef idx="2">
+            <a:schemeClr val="accent1"/>
+          </a:lnRef>
+          <a:fillRef idx="1">
+            <a:schemeClr val="lt1"/>
+          </a:fillRef>
+          <a:effectRef idx="0">
+            <a:schemeClr val="accent1"/>
+          </a:effectRef>
+          <a:fontRef idx="minor">
+            <a:schemeClr val="dk1"/>
+          </a:fontRef>
+        </p:style>
+        <p:txBody>
+          <a:bodyPr rot="0" spcFirstLastPara="0" vertOverflow="overflow" horzOverflow="overflow" vert="horz" wrap="square" lIns="91440" tIns="45720" rIns="91440" bIns="45720" numCol="1" spcCol="0" rtlCol="0" fromWordArt="0" anchor="ctr" anchorCtr="0" forceAA="0" compatLnSpc="1">
+            <a:prstTxWarp prst="textNoShape">
+              <a:avLst/>
+            </a:prstTxWarp>
+            <a:noAutofit/>
+          </a:bodyPr>
+          <a:lstStyle/>
+          <a:p>
+            <a:pPr algn="ctr"/>
+            <a:r>
+              <a:rPr lang="en-US" sz="2400" dirty="0" err="1">
+                <a:solidFill>
+                  <a:schemeClr val="tx1"/>
+                </a:solidFill>
+              </a:rPr>
+              <a:t>WidgetFactory.rkt</a:t>
+            </a:r>
+            <a:endParaRPr lang="en-US" sz="2400" dirty="0">
+              <a:solidFill>
+                <a:schemeClr val="tx1"/>
+              </a:solidFill>
+            </a:endParaRPr>
+          </a:p>
+        </p:txBody>
+      </p:sp>
+      <p:cxnSp>
+        <p:nvCxnSpPr>
+          <p:cNvPr id="10" name="Straight Arrow Connector 9"/>
+          <p:cNvCxnSpPr>
+            <a:stCxn id="7" idx="2"/>
+            <a:endCxn id="8" idx="0"/>
+          </p:cNvCxnSpPr>
+          <p:nvPr/>
+        </p:nvCxnSpPr>
+        <p:spPr>
+          <a:xfrm>
+            <a:off x="2510204" y="2990422"/>
+            <a:ext cx="452804" cy="1572785"/>
+          </a:xfrm>
+          <a:prstGeom prst="straightConnector1">
+            <a:avLst/>
+          </a:prstGeom>
+          <a:ln w="12700">
+            <a:solidFill>
+              <a:schemeClr val="tx1"/>
+            </a:solidFill>
+            <a:tailEnd type="triangle"/>
+          </a:ln>
+        </p:spPr>
+        <p:style>
+          <a:lnRef idx="1">
+            <a:schemeClr val="accent1"/>
+          </a:lnRef>
+          <a:fillRef idx="0">
+            <a:schemeClr val="accent1"/>
+          </a:fillRef>
+          <a:effectRef idx="0">
+            <a:schemeClr val="accent1"/>
+          </a:effectRef>
+          <a:fontRef idx="minor">
+            <a:schemeClr val="tx1"/>
+          </a:fontRef>
+        </p:style>
+      </p:cxnSp>
+      <p:sp>
+        <p:nvSpPr>
+          <p:cNvPr id="11" name="TextBox 10"/>
+          <p:cNvSpPr txBox="1"/>
+          <p:nvPr/>
+        </p:nvSpPr>
+        <p:spPr>
+          <a:xfrm>
+            <a:off x="2747596" y="3592148"/>
+            <a:ext cx="1100558" cy="369332"/>
+          </a:xfrm>
+          <a:prstGeom prst="rect">
+            <a:avLst/>
+          </a:prstGeom>
+          <a:noFill/>
+        </p:spPr>
+        <p:txBody>
+          <a:bodyPr wrap="none" rtlCol="0">
+            <a:spAutoFit/>
+          </a:bodyPr>
+          <a:lstStyle/>
+          <a:p>
+            <a:r>
+              <a:rPr lang="en-US" dirty="0"/>
+              <a:t>make-ball</a:t>
+            </a:r>
+          </a:p>
+        </p:txBody>
+      </p:sp>
+      <p:sp>
+        <p:nvSpPr>
+          <p:cNvPr id="13" name="Rectangle 12"/>
+          <p:cNvSpPr/>
+          <p:nvPr/>
+        </p:nvSpPr>
+        <p:spPr>
+          <a:xfrm>
+            <a:off x="4843096" y="1971308"/>
+            <a:ext cx="3420208" cy="1915686"/>
+          </a:xfrm>
+          <a:prstGeom prst="rect">
+            <a:avLst/>
+          </a:prstGeom>
+          <a:solidFill>
+            <a:schemeClr val="accent1">
+              <a:lumMod val="20000"/>
+              <a:lumOff val="80000"/>
+            </a:schemeClr>
+          </a:solidFill>
+          <a:ln>
+            <a:noFill/>
+          </a:ln>
+        </p:spPr>
+        <p:style>
+          <a:lnRef idx="2">
+            <a:schemeClr val="accent1"/>
+          </a:lnRef>
+          <a:fillRef idx="1">
+            <a:schemeClr val="lt1"/>
+          </a:fillRef>
+          <a:effectRef idx="0">
+            <a:schemeClr val="accent1"/>
+          </a:effectRef>
+          <a:fontRef idx="minor">
+            <a:schemeClr val="dk1"/>
+          </a:fontRef>
+        </p:style>
+        <p:txBody>
+          <a:bodyPr rot="0" spcFirstLastPara="0" vertOverflow="overflow" horzOverflow="overflow" vert="horz" wrap="square" lIns="91440" tIns="45720" rIns="91440" bIns="45720" numCol="1" spcCol="0" rtlCol="0" fromWordArt="0" anchor="ctr" anchorCtr="0" forceAA="0" compatLnSpc="1">
+            <a:prstTxWarp prst="textNoShape">
+              <a:avLst/>
+            </a:prstTxWarp>
+            <a:noAutofit/>
+          </a:bodyPr>
+          <a:lstStyle/>
+          <a:p>
+            <a:r>
+              <a:rPr lang="en-US" dirty="0">
+                <a:solidFill>
+                  <a:schemeClr val="tx1"/>
+                </a:solidFill>
+              </a:rPr>
+              <a:t>Here’s a piece of the dependency diagram for the system in 11-7.  It shows that </a:t>
+            </a:r>
+            <a:r>
+              <a:rPr lang="en-US" dirty="0" err="1">
+                <a:solidFill>
+                  <a:schemeClr val="tx1"/>
+                </a:solidFill>
+              </a:rPr>
+              <a:t>WidgetFactory.rkt</a:t>
+            </a:r>
+            <a:r>
+              <a:rPr lang="en-US" dirty="0">
+                <a:solidFill>
+                  <a:schemeClr val="tx1"/>
+                </a:solidFill>
+              </a:rPr>
+              <a:t> requires </a:t>
+            </a:r>
+            <a:r>
+              <a:rPr lang="en-US" dirty="0" err="1">
+                <a:solidFill>
+                  <a:schemeClr val="tx1"/>
+                </a:solidFill>
+              </a:rPr>
+              <a:t>SBall.rkt</a:t>
+            </a:r>
+            <a:r>
+              <a:rPr lang="en-US" dirty="0">
+                <a:solidFill>
+                  <a:schemeClr val="tx1"/>
+                </a:solidFill>
+              </a:rPr>
+              <a:t>, and that </a:t>
+            </a:r>
+            <a:r>
+              <a:rPr lang="en-US" dirty="0" err="1">
+                <a:solidFill>
+                  <a:schemeClr val="tx1"/>
+                </a:solidFill>
+              </a:rPr>
+              <a:t>SBall.rkt</a:t>
+            </a:r>
+            <a:r>
+              <a:rPr lang="en-US" dirty="0">
+                <a:solidFill>
+                  <a:schemeClr val="tx1"/>
+                </a:solidFill>
+              </a:rPr>
+              <a:t> provides make-ball to </a:t>
+            </a:r>
+            <a:r>
+              <a:rPr lang="en-US" dirty="0" err="1">
+                <a:solidFill>
+                  <a:schemeClr val="tx1"/>
+                </a:solidFill>
+              </a:rPr>
+              <a:t>WidgetFactory.rkt</a:t>
+            </a:r>
+            <a:r>
+              <a:rPr lang="en-US" dirty="0">
+                <a:solidFill>
+                  <a:schemeClr val="tx1"/>
+                </a:solidFill>
+              </a:rPr>
+              <a:t>.</a:t>
+            </a:r>
+          </a:p>
+        </p:txBody>
+      </p:sp>
+      <p:sp>
+        <p:nvSpPr>
+          <p:cNvPr id="15" name="Rectangle 14"/>
+          <p:cNvSpPr/>
+          <p:nvPr/>
+        </p:nvSpPr>
+        <p:spPr>
+          <a:xfrm>
+            <a:off x="4906108" y="4352192"/>
+            <a:ext cx="3357196" cy="1459523"/>
+          </a:xfrm>
+          <a:prstGeom prst="rect">
+            <a:avLst/>
+          </a:prstGeom>
+          <a:solidFill>
+            <a:schemeClr val="accent1">
+              <a:lumMod val="20000"/>
+              <a:lumOff val="80000"/>
+            </a:schemeClr>
+          </a:solidFill>
+          <a:ln>
+            <a:noFill/>
+          </a:ln>
+        </p:spPr>
+        <p:style>
+          <a:lnRef idx="2">
+            <a:schemeClr val="accent1"/>
+          </a:lnRef>
+          <a:fillRef idx="1">
+            <a:schemeClr val="lt1"/>
+          </a:fillRef>
+          <a:effectRef idx="0">
+            <a:schemeClr val="accent1"/>
+          </a:effectRef>
+          <a:fontRef idx="minor">
+            <a:schemeClr val="dk1"/>
+          </a:fontRef>
+        </p:style>
+        <p:txBody>
+          <a:bodyPr rot="0" spcFirstLastPara="0" vertOverflow="overflow" horzOverflow="overflow" vert="horz" wrap="square" lIns="91440" tIns="45720" rIns="91440" bIns="45720" numCol="1" spcCol="0" rtlCol="0" fromWordArt="0" anchor="ctr" anchorCtr="0" forceAA="0" compatLnSpc="1">
+            <a:prstTxWarp prst="textNoShape">
+              <a:avLst/>
+            </a:prstTxWarp>
+            <a:noAutofit/>
+          </a:bodyPr>
+          <a:lstStyle/>
+          <a:p>
+            <a:pPr algn="ctr"/>
+            <a:r>
+              <a:rPr lang="en-US" dirty="0">
+                <a:solidFill>
+                  <a:schemeClr val="tx1"/>
+                </a:solidFill>
+              </a:rPr>
+              <a:t>Exercise: draw the dependency graph for the 9 files in the 11-7 folder.  What structure can you find?</a:t>
+            </a:r>
+          </a:p>
+        </p:txBody>
+      </p:sp>
+    </p:spTree>
+    <p:extLst>
+      <p:ext uri="{BB962C8B-B14F-4D97-AF65-F5344CB8AC3E}">
+        <p14:creationId xmlns:p14="http://schemas.microsoft.com/office/powerpoint/2010/main" val="2808472510"/>
+      </p:ext>
+    </p:extLst>
+  </p:cSld>
+  <p:clrMapOvr>
+    <a:masterClrMapping/>
+  </p:clrMapOvr>
+</p:sld>
+</file>
+
+<file path=ppt/slides/slide39.xml><?xml version="1.0" encoding="utf-8"?>
+<p:sld xmlns:a="http://schemas.openxmlformats.org/drawingml/2006/main" xmlns:r="http://schemas.openxmlformats.org/officeDocument/2006/relationships" xmlns:p="http://schemas.openxmlformats.org/presentationml/2006/main">
+  <p:cSld>
+    <p:spTree>
+      <p:nvGrpSpPr>
+        <p:cNvPr id="1" name=""/>
+        <p:cNvGrpSpPr/>
+        <p:nvPr/>
+      </p:nvGrpSpPr>
+      <p:grpSpPr>
+        <a:xfrm>
+          <a:off x="0" y="0"/>
+          <a:ext cx="0" cy="0"/>
+          <a:chOff x="0" y="0"/>
+          <a:chExt cx="0" cy="0"/>
+        </a:xfrm>
+      </p:grpSpPr>
+      <p:sp>
+        <p:nvSpPr>
+          <p:cNvPr id="2" name="Title 1"/>
+          <p:cNvSpPr>
+            <a:spLocks noGrp="1"/>
+          </p:cNvSpPr>
+          <p:nvPr>
+            <p:ph type="title"/>
+          </p:nvPr>
+        </p:nvSpPr>
+        <p:spPr/>
+        <p:txBody>
           <a:bodyPr/>
           <a:lstStyle/>
           <a:p>
@@ -20523,13 +20973,21 @@
           <a:p>
             <a:pPr lvl="1"/>
             <a:r>
+              <a:rPr lang="en-US" dirty="0"/>
+              <a:t>Do some diffs so you see exactly what changes between one version and the next.</a:t>
+            </a:r>
+          </a:p>
+          <a:p>
+            <a:pPr lvl="1"/>
+            <a:r>
+              <a:rPr lang="en-US" dirty="0"/>
+              <a:t>Draw the </a:t>
+            </a:r>
+            <a:r>
               <a:rPr lang="en-US"/>
-              <a:t>Do </a:t>
-            </a:r>
-            <a:r>
-              <a:rPr lang="en-US" dirty="0"/>
-              <a:t>some diffs so you see exactly what changes between one version and the next.</a:t>
-            </a:r>
+              <a:t>dependency graph for the files in 11-7-separate-files.</a:t>
+            </a:r>
+            <a:endParaRPr lang="en-US" dirty="0"/>
           </a:p>
           <a:p>
             <a:r>
@@ -20563,7 +21021,7 @@
             <a:fld id="{B6F15528-21DE-4FAA-801E-634DDDAF4B2B}" type="slidenum">
               <a:rPr lang="en-US" smtClean="0"/>
               <a:pPr/>
-              <a:t>38</a:t>
+              <a:t>39</a:t>
             </a:fld>
             <a:endParaRPr lang="en-US"/>
           </a:p>
@@ -23125,12 +23583,14 @@
     <a:spDef>
       <a:spPr>
         <a:solidFill>
-          <a:schemeClr val="accent3">
-            <a:lumMod val="40000"/>
-            <a:lumOff val="60000"/>
+          <a:schemeClr val="accent1">
+            <a:lumMod val="20000"/>
+            <a:lumOff val="80000"/>
           </a:schemeClr>
         </a:solidFill>
-        <a:ln/>
+        <a:ln>
+          <a:noFill/>
+        </a:ln>
       </a:spPr>
       <a:bodyPr rot="0" spcFirstLastPara="0" vertOverflow="overflow" horzOverflow="overflow" vert="horz" wrap="square" lIns="91440" tIns="45720" rIns="91440" bIns="45720" numCol="1" spcCol="0" rtlCol="0" fromWordArt="0" anchor="ctr" anchorCtr="0" forceAA="0" compatLnSpc="1">
         <a:prstTxWarp prst="textNoShape">
@@ -23140,7 +23600,7 @@
       </a:bodyPr>
       <a:lstStyle>
         <a:defPPr algn="ctr">
-          <a:defRPr sz="1200" dirty="0">
+          <a:defRPr dirty="0" smtClean="0">
             <a:solidFill>
               <a:schemeClr val="tx1"/>
             </a:solidFill>

</xml_diff>